<commit_message>
- Corrected minor error
git-svn-id: https://svn.eiffel.com/eiffelstudio-public/trunk@80318 8089f293-4706-0410-a29e-feb5c42a2edf
</commit_message>
<xml_diff>
--- a/Src/framework/web/xebra/doc/XebraNetwork.pptx
+++ b/Src/framework/web/xebra/doc/XebraNetwork.pptx
@@ -3035,6 +3035,84 @@
           <a:chExt cx="0" cy="0"/>
         </a:xfrm>
       </p:grpSpPr>
+      <p:sp>
+        <p:nvSpPr>
+          <p:cNvPr id="116" name="Rechteck 115"/>
+          <p:cNvSpPr/>
+          <p:nvPr/>
+        </p:nvSpPr>
+        <p:spPr>
+          <a:xfrm>
+            <a:off x="3143240" y="571480"/>
+            <a:ext cx="2832088" cy="4714908"/>
+          </a:xfrm>
+          <a:prstGeom prst="rect">
+            <a:avLst/>
+          </a:prstGeom>
+          <a:ln/>
+        </p:spPr>
+        <p:style>
+          <a:lnRef idx="2">
+            <a:schemeClr val="accent1"/>
+          </a:lnRef>
+          <a:fillRef idx="1">
+            <a:schemeClr val="lt1"/>
+          </a:fillRef>
+          <a:effectRef idx="0">
+            <a:schemeClr val="accent1"/>
+          </a:effectRef>
+          <a:fontRef idx="minor">
+            <a:schemeClr val="dk1"/>
+          </a:fontRef>
+        </p:style>
+        <p:txBody>
+          <a:bodyPr rtlCol="0" anchor="ctr"/>
+          <a:lstStyle/>
+          <a:p>
+            <a:pPr algn="ctr"/>
+            <a:endParaRPr lang="en-US" sz="1200" dirty="0" smtClean="0"/>
+          </a:p>
+        </p:txBody>
+      </p:sp>
+      <p:sp>
+        <p:nvSpPr>
+          <p:cNvPr id="115" name="Rechteck 114"/>
+          <p:cNvSpPr/>
+          <p:nvPr/>
+        </p:nvSpPr>
+        <p:spPr>
+          <a:xfrm>
+            <a:off x="6858016" y="571480"/>
+            <a:ext cx="2260584" cy="4714908"/>
+          </a:xfrm>
+          <a:prstGeom prst="rect">
+            <a:avLst/>
+          </a:prstGeom>
+          <a:ln/>
+        </p:spPr>
+        <p:style>
+          <a:lnRef idx="2">
+            <a:schemeClr val="accent6"/>
+          </a:lnRef>
+          <a:fillRef idx="1">
+            <a:schemeClr val="lt1"/>
+          </a:fillRef>
+          <a:effectRef idx="0">
+            <a:schemeClr val="accent6"/>
+          </a:effectRef>
+          <a:fontRef idx="minor">
+            <a:schemeClr val="dk1"/>
+          </a:fontRef>
+        </p:style>
+        <p:txBody>
+          <a:bodyPr rtlCol="0" anchor="ctr"/>
+          <a:lstStyle/>
+          <a:p>
+            <a:pPr algn="ctr"/>
+            <a:endParaRPr lang="en-US" sz="1200" dirty="0" smtClean="0"/>
+          </a:p>
+        </p:txBody>
+      </p:sp>
       <p:cxnSp>
         <p:nvCxnSpPr>
           <p:cNvPr id="93" name="Gerade Verbindung mit Pfeil 92"/>
@@ -3043,8 +3121,8 @@
         </p:nvCxnSpPr>
         <p:spPr>
           <a:xfrm rot="10800000">
-            <a:off x="4786314" y="3571876"/>
-            <a:ext cx="1928826" cy="1588"/>
+            <a:off x="5500694" y="2071678"/>
+            <a:ext cx="1857388" cy="1588"/>
           </a:xfrm>
           <a:prstGeom prst="straightConnector1">
             <a:avLst/>
@@ -3076,8 +3154,8 @@
         </p:nvCxnSpPr>
         <p:spPr>
           <a:xfrm>
-            <a:off x="4786314" y="3286124"/>
-            <a:ext cx="1928826" cy="1588"/>
+            <a:off x="5500694" y="1785926"/>
+            <a:ext cx="1857388" cy="1588"/>
           </a:xfrm>
           <a:prstGeom prst="straightConnector1">
             <a:avLst/>
@@ -3109,7 +3187,7 @@
         </p:nvCxnSpPr>
         <p:spPr>
           <a:xfrm>
-            <a:off x="2500298" y="3286124"/>
+            <a:off x="2500298" y="1785926"/>
             <a:ext cx="857256" cy="1588"/>
           </a:xfrm>
           <a:prstGeom prst="straightConnector1">
@@ -3142,7 +3220,7 @@
         </p:nvSpPr>
         <p:spPr>
           <a:xfrm>
-            <a:off x="3357554" y="3214686"/>
+            <a:off x="3357554" y="1714488"/>
             <a:ext cx="1428760" cy="428628"/>
           </a:xfrm>
           <a:prstGeom prst="roundRect">
@@ -3187,7 +3265,7 @@
         </p:nvSpPr>
         <p:spPr>
           <a:xfrm>
-            <a:off x="2643174" y="3071810"/>
+            <a:off x="2643174" y="1571612"/>
             <a:ext cx="571504" cy="214314"/>
           </a:xfrm>
           <a:prstGeom prst="rect">
@@ -3230,7 +3308,7 @@
         </p:nvSpPr>
         <p:spPr>
           <a:xfrm>
-            <a:off x="6715140" y="3214686"/>
+            <a:off x="7358082" y="1714488"/>
             <a:ext cx="1714512" cy="428628"/>
           </a:xfrm>
           <a:prstGeom prst="roundRect">
@@ -3269,16 +3347,16 @@
       </p:sp>
       <p:sp>
         <p:nvSpPr>
-          <p:cNvPr id="24" name="Ellipse 23"/>
+          <p:cNvPr id="28" name="Abgerundetes Rechteck 27"/>
           <p:cNvSpPr/>
           <p:nvPr/>
         </p:nvSpPr>
         <p:spPr>
           <a:xfrm>
-            <a:off x="71406" y="2857496"/>
-            <a:ext cx="571472" cy="428628"/>
-          </a:xfrm>
-          <a:prstGeom prst="ellipse">
+            <a:off x="1428728" y="1357298"/>
+            <a:ext cx="928694" cy="500066"/>
+          </a:xfrm>
+          <a:prstGeom prst="roundRect">
             <a:avLst/>
           </a:prstGeom>
           <a:ln w="6350"/>
@@ -3306,51 +3384,6 @@
             <a:pPr algn="ctr"/>
             <a:r>
               <a:rPr lang="de-CH" sz="900" dirty="0" smtClean="0"/>
-              <a:t>User</a:t>
-            </a:r>
-            <a:endParaRPr lang="en-US" sz="900" dirty="0" smtClean="0"/>
-          </a:p>
-        </p:txBody>
-      </p:sp>
-      <p:sp>
-        <p:nvSpPr>
-          <p:cNvPr id="28" name="Abgerundetes Rechteck 27"/>
-          <p:cNvSpPr/>
-          <p:nvPr/>
-        </p:nvSpPr>
-        <p:spPr>
-          <a:xfrm>
-            <a:off x="1428728" y="2857496"/>
-            <a:ext cx="928694" cy="500066"/>
-          </a:xfrm>
-          <a:prstGeom prst="roundRect">
-            <a:avLst/>
-          </a:prstGeom>
-          <a:ln w="6350"/>
-        </p:spPr>
-        <p:style>
-          <a:lnRef idx="2">
-            <a:schemeClr val="accent3">
-              <a:shade val="50000"/>
-            </a:schemeClr>
-          </a:lnRef>
-          <a:fillRef idx="1">
-            <a:schemeClr val="accent3"/>
-          </a:fillRef>
-          <a:effectRef idx="0">
-            <a:schemeClr val="accent3"/>
-          </a:effectRef>
-          <a:fontRef idx="minor">
-            <a:schemeClr val="lt1"/>
-          </a:fontRef>
-        </p:style>
-        <p:txBody>
-          <a:bodyPr rtlCol="0" anchor="ctr"/>
-          <a:lstStyle/>
-          <a:p>
-            <a:pPr algn="ctr"/>
-            <a:r>
-              <a:rPr lang="de-CH" sz="900" dirty="0" smtClean="0"/>
               <a:t>HTTP Server</a:t>
             </a:r>
             <a:endParaRPr lang="en-US" sz="900" dirty="0" smtClean="0"/>
@@ -3365,8 +3398,8 @@
         </p:nvSpPr>
         <p:spPr>
           <a:xfrm>
-            <a:off x="1714480" y="3214686"/>
-            <a:ext cx="785818" cy="357190"/>
+            <a:off x="1571604" y="1714488"/>
+            <a:ext cx="928694" cy="428628"/>
           </a:xfrm>
           <a:prstGeom prst="roundRect">
             <a:avLst/>
@@ -3395,8 +3428,12 @@
           <a:p>
             <a:pPr algn="ctr"/>
             <a:r>
+              <a:rPr lang="de-CH" sz="900" dirty="0" err="1" smtClean="0"/>
+              <a:t>Xebra</a:t>
+            </a:r>
+            <a:r>
               <a:rPr lang="de-CH" sz="900" dirty="0" smtClean="0"/>
-              <a:t>HTTP </a:t>
+              <a:t> HTTP Server </a:t>
             </a:r>
             <a:r>
               <a:rPr lang="de-CH" sz="900" dirty="0" err="1" smtClean="0"/>
@@ -3414,7 +3451,7 @@
         </p:nvSpPr>
         <p:spPr>
           <a:xfrm>
-            <a:off x="5000628" y="3071810"/>
+            <a:off x="5715008" y="1571612"/>
             <a:ext cx="1428760" cy="214314"/>
           </a:xfrm>
           <a:prstGeom prst="rect">
@@ -3456,7 +3493,7 @@
         </p:nvSpPr>
         <p:spPr>
           <a:xfrm>
-            <a:off x="5000628" y="3571876"/>
+            <a:off x="5715008" y="2071678"/>
             <a:ext cx="1500198" cy="214314"/>
           </a:xfrm>
           <a:prstGeom prst="rect">
@@ -3498,7 +3535,7 @@
         </p:nvCxnSpPr>
         <p:spPr>
           <a:xfrm>
-            <a:off x="642910" y="3000372"/>
+            <a:off x="642910" y="1500174"/>
             <a:ext cx="785818" cy="1588"/>
           </a:xfrm>
           <a:prstGeom prst="straightConnector1">
@@ -3531,7 +3568,7 @@
         </p:nvCxnSpPr>
         <p:spPr>
           <a:xfrm rot="10800000">
-            <a:off x="2500298" y="3500438"/>
+            <a:off x="2500298" y="2000240"/>
             <a:ext cx="857256" cy="1588"/>
           </a:xfrm>
           <a:prstGeom prst="straightConnector1">
@@ -3564,7 +3601,7 @@
         </p:nvSpPr>
         <p:spPr>
           <a:xfrm>
-            <a:off x="2643174" y="3500438"/>
+            <a:off x="2643174" y="2000240"/>
             <a:ext cx="571504" cy="214314"/>
           </a:xfrm>
           <a:prstGeom prst="rect">
@@ -3607,7 +3644,7 @@
         </p:nvCxnSpPr>
         <p:spPr>
           <a:xfrm rot="10800000">
-            <a:off x="571472" y="3214686"/>
+            <a:off x="571472" y="1714488"/>
             <a:ext cx="857256" cy="1588"/>
           </a:xfrm>
           <a:prstGeom prst="straightConnector1">
@@ -3640,7 +3677,7 @@
         </p:nvSpPr>
         <p:spPr>
           <a:xfrm>
-            <a:off x="714348" y="3214686"/>
+            <a:off x="714348" y="1714488"/>
             <a:ext cx="642942" cy="214314"/>
           </a:xfrm>
           <a:prstGeom prst="rect">
@@ -3683,7 +3720,7 @@
         </p:nvSpPr>
         <p:spPr>
           <a:xfrm>
-            <a:off x="714348" y="2786058"/>
+            <a:off x="714348" y="1285860"/>
             <a:ext cx="581028" cy="214314"/>
           </a:xfrm>
           <a:prstGeom prst="rect">
@@ -3718,11 +3755,836 @@
           </a:p>
         </p:txBody>
       </p:sp>
+      <p:sp>
+        <p:nvSpPr>
+          <p:cNvPr id="24" name="Ellipse 23"/>
+          <p:cNvSpPr/>
+          <p:nvPr/>
+        </p:nvSpPr>
+        <p:spPr>
+          <a:xfrm>
+            <a:off x="71406" y="1357298"/>
+            <a:ext cx="571472" cy="428628"/>
+          </a:xfrm>
+          <a:prstGeom prst="ellipse">
+            <a:avLst/>
+          </a:prstGeom>
+          <a:ln/>
+        </p:spPr>
+        <p:style>
+          <a:lnRef idx="2">
+            <a:schemeClr val="dk1">
+              <a:shade val="50000"/>
+            </a:schemeClr>
+          </a:lnRef>
+          <a:fillRef idx="1">
+            <a:schemeClr val="dk1"/>
+          </a:fillRef>
+          <a:effectRef idx="0">
+            <a:schemeClr val="dk1"/>
+          </a:effectRef>
+          <a:fontRef idx="minor">
+            <a:schemeClr val="lt1"/>
+          </a:fontRef>
+        </p:style>
+        <p:txBody>
+          <a:bodyPr rtlCol="0" anchor="ctr"/>
+          <a:lstStyle/>
+          <a:p>
+            <a:pPr algn="ctr"/>
+            <a:r>
+              <a:rPr lang="de-CH" sz="900" dirty="0" smtClean="0"/>
+              <a:t>User</a:t>
+            </a:r>
+            <a:endParaRPr lang="en-US" sz="900" dirty="0" smtClean="0"/>
+          </a:p>
+        </p:txBody>
+      </p:sp>
+      <p:sp>
+        <p:nvSpPr>
+          <p:cNvPr id="103" name="Abgerundetes Rechteck 102"/>
+          <p:cNvSpPr/>
+          <p:nvPr/>
+        </p:nvSpPr>
+        <p:spPr>
+          <a:xfrm>
+            <a:off x="4786314" y="1714488"/>
+            <a:ext cx="714380" cy="428628"/>
+          </a:xfrm>
+          <a:prstGeom prst="roundRect">
+            <a:avLst/>
+          </a:prstGeom>
+          <a:ln w="6350"/>
+        </p:spPr>
+        <p:style>
+          <a:lnRef idx="2">
+            <a:schemeClr val="accent1">
+              <a:shade val="50000"/>
+            </a:schemeClr>
+          </a:lnRef>
+          <a:fillRef idx="1">
+            <a:schemeClr val="accent1"/>
+          </a:fillRef>
+          <a:effectRef idx="0">
+            <a:schemeClr val="accent1"/>
+          </a:effectRef>
+          <a:fontRef idx="minor">
+            <a:schemeClr val="lt1"/>
+          </a:fontRef>
+        </p:style>
+        <p:txBody>
+          <a:bodyPr rtlCol="0" anchor="ctr"/>
+          <a:lstStyle/>
+          <a:p>
+            <a:pPr algn="ctr"/>
+            <a:r>
+              <a:rPr lang="de-CH" sz="900" dirty="0" smtClean="0"/>
+              <a:t>XS_SEND</a:t>
+            </a:r>
+            <a:endParaRPr lang="en-US" sz="900" dirty="0"/>
+          </a:p>
+        </p:txBody>
+      </p:sp>
+      <p:cxnSp>
+        <p:nvCxnSpPr>
+          <p:cNvPr id="108" name="Gerade Verbindung mit Pfeil 107"/>
+          <p:cNvCxnSpPr/>
+          <p:nvPr/>
+        </p:nvCxnSpPr>
+        <p:spPr>
+          <a:xfrm rot="10800000">
+            <a:off x="5500694" y="4071942"/>
+            <a:ext cx="1857388" cy="1588"/>
+          </a:xfrm>
+          <a:prstGeom prst="straightConnector1">
+            <a:avLst/>
+          </a:prstGeom>
+          <a:ln>
+            <a:tailEnd type="arrow"/>
+          </a:ln>
+        </p:spPr>
+        <p:style>
+          <a:lnRef idx="2">
+            <a:schemeClr val="accent2"/>
+          </a:lnRef>
+          <a:fillRef idx="0">
+            <a:schemeClr val="accent2"/>
+          </a:fillRef>
+          <a:effectRef idx="1">
+            <a:schemeClr val="accent2"/>
+          </a:effectRef>
+          <a:fontRef idx="minor">
+            <a:schemeClr val="tx1"/>
+          </a:fontRef>
+        </p:style>
+      </p:cxnSp>
+      <p:cxnSp>
+        <p:nvCxnSpPr>
+          <p:cNvPr id="109" name="Gerade Verbindung mit Pfeil 108"/>
+          <p:cNvCxnSpPr/>
+          <p:nvPr/>
+        </p:nvCxnSpPr>
+        <p:spPr>
+          <a:xfrm>
+            <a:off x="5500694" y="4357694"/>
+            <a:ext cx="1857388" cy="1588"/>
+          </a:xfrm>
+          <a:prstGeom prst="straightConnector1">
+            <a:avLst/>
+          </a:prstGeom>
+          <a:ln>
+            <a:tailEnd type="arrow"/>
+          </a:ln>
+        </p:spPr>
+        <p:style>
+          <a:lnRef idx="2">
+            <a:schemeClr val="accent2"/>
+          </a:lnRef>
+          <a:fillRef idx="0">
+            <a:schemeClr val="accent2"/>
+          </a:fillRef>
+          <a:effectRef idx="1">
+            <a:schemeClr val="accent2"/>
+          </a:effectRef>
+          <a:fontRef idx="minor">
+            <a:schemeClr val="tx1"/>
+          </a:fontRef>
+        </p:style>
+      </p:cxnSp>
+      <p:sp>
+        <p:nvSpPr>
+          <p:cNvPr id="110" name="Abgerundetes Rechteck 109"/>
+          <p:cNvSpPr/>
+          <p:nvPr/>
+        </p:nvSpPr>
+        <p:spPr>
+          <a:xfrm>
+            <a:off x="3929058" y="4000504"/>
+            <a:ext cx="1571636" cy="428628"/>
+          </a:xfrm>
+          <a:prstGeom prst="roundRect">
+            <a:avLst/>
+          </a:prstGeom>
+          <a:ln w="6350"/>
+        </p:spPr>
+        <p:style>
+          <a:lnRef idx="2">
+            <a:schemeClr val="accent1">
+              <a:shade val="50000"/>
+            </a:schemeClr>
+          </a:lnRef>
+          <a:fillRef idx="1">
+            <a:schemeClr val="accent1"/>
+          </a:fillRef>
+          <a:effectRef idx="0">
+            <a:schemeClr val="accent1"/>
+          </a:effectRef>
+          <a:fontRef idx="minor">
+            <a:schemeClr val="lt1"/>
+          </a:fontRef>
+        </p:style>
+        <p:txBody>
+          <a:bodyPr rtlCol="0" anchor="ctr"/>
+          <a:lstStyle/>
+          <a:p>
+            <a:pPr algn="ctr"/>
+            <a:r>
+              <a:rPr lang="en-US" sz="900" dirty="0" smtClean="0"/>
+              <a:t>XS_WEBAPP_CMD_MODULE</a:t>
+            </a:r>
+            <a:endParaRPr lang="en-US" sz="900" dirty="0"/>
+          </a:p>
+        </p:txBody>
+      </p:sp>
+      <p:sp>
+        <p:nvSpPr>
+          <p:cNvPr id="111" name="Abgerundetes Rechteck 110"/>
+          <p:cNvSpPr/>
+          <p:nvPr/>
+        </p:nvSpPr>
+        <p:spPr>
+          <a:xfrm>
+            <a:off x="7358082" y="4000504"/>
+            <a:ext cx="1714512" cy="428628"/>
+          </a:xfrm>
+          <a:prstGeom prst="roundRect">
+            <a:avLst/>
+          </a:prstGeom>
+          <a:ln w="6350"/>
+        </p:spPr>
+        <p:style>
+          <a:lnRef idx="2">
+            <a:schemeClr val="accent6">
+              <a:shade val="50000"/>
+            </a:schemeClr>
+          </a:lnRef>
+          <a:fillRef idx="1">
+            <a:schemeClr val="accent6"/>
+          </a:fillRef>
+          <a:effectRef idx="0">
+            <a:schemeClr val="accent6"/>
+          </a:effectRef>
+          <a:fontRef idx="minor">
+            <a:schemeClr val="lt1"/>
+          </a:fontRef>
+        </p:style>
+        <p:txBody>
+          <a:bodyPr rtlCol="0" anchor="ctr"/>
+          <a:lstStyle/>
+          <a:p>
+            <a:pPr algn="ctr"/>
+            <a:r>
+              <a:rPr lang="en-US" sz="900" dirty="0" smtClean="0"/>
+              <a:t>XWA_SERVER_CONTROL</a:t>
+            </a:r>
+            <a:endParaRPr lang="en-US" sz="900" dirty="0"/>
+          </a:p>
+        </p:txBody>
+      </p:sp>
+      <p:sp>
+        <p:nvSpPr>
+          <p:cNvPr id="112" name="Rechteck 111"/>
+          <p:cNvSpPr/>
+          <p:nvPr/>
+        </p:nvSpPr>
+        <p:spPr>
+          <a:xfrm>
+            <a:off x="5715008" y="3857628"/>
+            <a:ext cx="1428760" cy="214314"/>
+          </a:xfrm>
+          <a:prstGeom prst="rect">
+            <a:avLst/>
+          </a:prstGeom>
+          <a:ln w="6350"/>
+        </p:spPr>
+        <p:style>
+          <a:lnRef idx="3">
+            <a:schemeClr val="lt1"/>
+          </a:lnRef>
+          <a:fillRef idx="1">
+            <a:schemeClr val="accent5"/>
+          </a:fillRef>
+          <a:effectRef idx="1">
+            <a:schemeClr val="accent5"/>
+          </a:effectRef>
+          <a:fontRef idx="minor">
+            <a:schemeClr val="lt1"/>
+          </a:fontRef>
+        </p:style>
+        <p:txBody>
+          <a:bodyPr rtlCol="0" anchor="ctr"/>
+          <a:lstStyle/>
+          <a:p>
+            <a:pPr algn="ctr"/>
+            <a:r>
+              <a:rPr lang="en-US" sz="900" dirty="0" smtClean="0"/>
+              <a:t>XC_SERVER_COMMAND</a:t>
+            </a:r>
+          </a:p>
+        </p:txBody>
+      </p:sp>
+      <p:sp>
+        <p:nvSpPr>
+          <p:cNvPr id="113" name="Rechteck 112"/>
+          <p:cNvSpPr/>
+          <p:nvPr/>
+        </p:nvSpPr>
+        <p:spPr>
+          <a:xfrm>
+            <a:off x="5715008" y="4357694"/>
+            <a:ext cx="1500198" cy="214314"/>
+          </a:xfrm>
+          <a:prstGeom prst="rect">
+            <a:avLst/>
+          </a:prstGeom>
+          <a:ln w="6350"/>
+        </p:spPr>
+        <p:style>
+          <a:lnRef idx="3">
+            <a:schemeClr val="lt1"/>
+          </a:lnRef>
+          <a:fillRef idx="1">
+            <a:schemeClr val="accent5"/>
+          </a:fillRef>
+          <a:effectRef idx="1">
+            <a:schemeClr val="accent5"/>
+          </a:effectRef>
+          <a:fontRef idx="minor">
+            <a:schemeClr val="lt1"/>
+          </a:fontRef>
+        </p:style>
+        <p:txBody>
+          <a:bodyPr rtlCol="0" anchor="ctr"/>
+          <a:lstStyle/>
+          <a:p>
+            <a:pPr algn="ctr"/>
+            <a:r>
+              <a:rPr lang="en-US" sz="900" dirty="0" smtClean="0"/>
+              <a:t>XC_COMMAND_RESPONSE</a:t>
+            </a:r>
+          </a:p>
+        </p:txBody>
+      </p:sp>
+      <p:sp>
+        <p:nvSpPr>
+          <p:cNvPr id="119" name="Abgerundetes Rechteck 118"/>
+          <p:cNvSpPr/>
+          <p:nvPr/>
+        </p:nvSpPr>
+        <p:spPr>
+          <a:xfrm>
+            <a:off x="3143240" y="571480"/>
+            <a:ext cx="1428760" cy="285752"/>
+          </a:xfrm>
+          <a:prstGeom prst="roundRect">
+            <a:avLst/>
+          </a:prstGeom>
+          <a:ln>
+            <a:solidFill>
+              <a:schemeClr val="accent1"/>
+            </a:solidFill>
+          </a:ln>
+        </p:spPr>
+        <p:style>
+          <a:lnRef idx="2">
+            <a:schemeClr val="accent1">
+              <a:shade val="50000"/>
+            </a:schemeClr>
+          </a:lnRef>
+          <a:fillRef idx="1">
+            <a:schemeClr val="accent1"/>
+          </a:fillRef>
+          <a:effectRef idx="0">
+            <a:schemeClr val="accent1"/>
+          </a:effectRef>
+          <a:fontRef idx="minor">
+            <a:schemeClr val="lt1"/>
+          </a:fontRef>
+        </p:style>
+        <p:txBody>
+          <a:bodyPr rtlCol="0" anchor="ctr"/>
+          <a:lstStyle/>
+          <a:p>
+            <a:pPr algn="ctr"/>
+            <a:r>
+              <a:rPr lang="de-CH" sz="1200" dirty="0" err="1" smtClean="0"/>
+              <a:t>Xebra</a:t>
+            </a:r>
+            <a:r>
+              <a:rPr lang="de-CH" sz="1200" dirty="0" smtClean="0"/>
+              <a:t> Server</a:t>
+            </a:r>
+            <a:endParaRPr lang="en-US" sz="1200" dirty="0" smtClean="0"/>
+          </a:p>
+        </p:txBody>
+      </p:sp>
+      <p:sp>
+        <p:nvSpPr>
+          <p:cNvPr id="120" name="Abgerundetes Rechteck 119"/>
+          <p:cNvSpPr/>
+          <p:nvPr/>
+        </p:nvSpPr>
+        <p:spPr>
+          <a:xfrm>
+            <a:off x="6858016" y="571480"/>
+            <a:ext cx="1428760" cy="285752"/>
+          </a:xfrm>
+          <a:prstGeom prst="roundRect">
+            <a:avLst/>
+          </a:prstGeom>
+          <a:ln>
+            <a:solidFill>
+              <a:schemeClr val="accent6"/>
+            </a:solidFill>
+          </a:ln>
+        </p:spPr>
+        <p:style>
+          <a:lnRef idx="2">
+            <a:schemeClr val="accent6">
+              <a:shade val="50000"/>
+            </a:schemeClr>
+          </a:lnRef>
+          <a:fillRef idx="1">
+            <a:schemeClr val="accent6"/>
+          </a:fillRef>
+          <a:effectRef idx="0">
+            <a:schemeClr val="accent6"/>
+          </a:effectRef>
+          <a:fontRef idx="minor">
+            <a:schemeClr val="lt1"/>
+          </a:fontRef>
+        </p:style>
+        <p:txBody>
+          <a:bodyPr rtlCol="0" anchor="ctr"/>
+          <a:lstStyle/>
+          <a:p>
+            <a:pPr algn="ctr"/>
+            <a:r>
+              <a:rPr lang="de-CH" sz="1200" dirty="0" err="1" smtClean="0"/>
+              <a:t>Xebra</a:t>
+            </a:r>
+            <a:r>
+              <a:rPr lang="de-CH" sz="1200" dirty="0" smtClean="0"/>
+              <a:t> </a:t>
+            </a:r>
+            <a:r>
+              <a:rPr lang="de-CH" sz="1200" dirty="0" err="1" smtClean="0"/>
+              <a:t>Webapp</a:t>
+            </a:r>
+            <a:endParaRPr lang="en-US" sz="1200" dirty="0" smtClean="0"/>
+          </a:p>
+        </p:txBody>
+      </p:sp>
+      <p:sp>
+        <p:nvSpPr>
+          <p:cNvPr id="124" name="Rechteck 123"/>
+          <p:cNvSpPr/>
+          <p:nvPr/>
+        </p:nvSpPr>
+        <p:spPr>
+          <a:xfrm>
+            <a:off x="0" y="3429000"/>
+            <a:ext cx="9144000" cy="1714512"/>
+          </a:xfrm>
+          <a:prstGeom prst="rect">
+            <a:avLst/>
+          </a:prstGeom>
+          <a:noFill/>
+          <a:ln w="12700">
+            <a:solidFill>
+              <a:schemeClr val="bg1">
+                <a:lumMod val="75000"/>
+              </a:schemeClr>
+            </a:solidFill>
+          </a:ln>
+        </p:spPr>
+        <p:style>
+          <a:lnRef idx="2">
+            <a:schemeClr val="dk1"/>
+          </a:lnRef>
+          <a:fillRef idx="1">
+            <a:schemeClr val="lt1"/>
+          </a:fillRef>
+          <a:effectRef idx="0">
+            <a:schemeClr val="dk1"/>
+          </a:effectRef>
+          <a:fontRef idx="minor">
+            <a:schemeClr val="dk1"/>
+          </a:fontRef>
+        </p:style>
+        <p:txBody>
+          <a:bodyPr rtlCol="0" anchor="ctr"/>
+          <a:lstStyle/>
+          <a:p>
+            <a:pPr algn="ctr"/>
+            <a:endParaRPr lang="en-US" sz="1200" dirty="0" smtClean="0"/>
+          </a:p>
+        </p:txBody>
+      </p:sp>
+      <p:sp>
+        <p:nvSpPr>
+          <p:cNvPr id="126" name="Rechteck 125"/>
+          <p:cNvSpPr/>
+          <p:nvPr/>
+        </p:nvSpPr>
+        <p:spPr>
+          <a:xfrm>
+            <a:off x="0" y="4786322"/>
+            <a:ext cx="2928926" cy="357190"/>
+          </a:xfrm>
+          <a:prstGeom prst="rect">
+            <a:avLst/>
+          </a:prstGeom>
+          <a:solidFill>
+            <a:schemeClr val="bg1">
+              <a:lumMod val="75000"/>
+            </a:schemeClr>
+          </a:solidFill>
+          <a:ln w="12700">
+            <a:solidFill>
+              <a:schemeClr val="bg1">
+                <a:lumMod val="75000"/>
+              </a:schemeClr>
+            </a:solidFill>
+          </a:ln>
+        </p:spPr>
+        <p:style>
+          <a:lnRef idx="2">
+            <a:schemeClr val="dk1"/>
+          </a:lnRef>
+          <a:fillRef idx="1">
+            <a:schemeClr val="lt1"/>
+          </a:fillRef>
+          <a:effectRef idx="0">
+            <a:schemeClr val="dk1"/>
+          </a:effectRef>
+          <a:fontRef idx="minor">
+            <a:schemeClr val="dk1"/>
+          </a:fontRef>
+        </p:style>
+        <p:txBody>
+          <a:bodyPr rtlCol="0" anchor="ctr"/>
+          <a:lstStyle/>
+          <a:p>
+            <a:r>
+              <a:rPr lang="de-CH" sz="1000" dirty="0" smtClean="0"/>
+              <a:t>The </a:t>
+            </a:r>
+            <a:r>
+              <a:rPr lang="de-CH" sz="1000" dirty="0" err="1" smtClean="0"/>
+              <a:t>Webapp</a:t>
+            </a:r>
+            <a:r>
+              <a:rPr lang="de-CH" sz="1000" dirty="0" smtClean="0"/>
+              <a:t> </a:t>
+            </a:r>
+            <a:r>
+              <a:rPr lang="de-CH" sz="1000" dirty="0" err="1" smtClean="0"/>
+              <a:t>sends</a:t>
+            </a:r>
+            <a:r>
+              <a:rPr lang="de-CH" sz="1000" dirty="0" smtClean="0"/>
+              <a:t> a </a:t>
+            </a:r>
+            <a:r>
+              <a:rPr lang="de-CH" sz="1000" dirty="0" err="1" smtClean="0"/>
+              <a:t>command</a:t>
+            </a:r>
+            <a:r>
+              <a:rPr lang="de-CH" sz="1000" dirty="0" smtClean="0"/>
+              <a:t> </a:t>
+            </a:r>
+            <a:r>
+              <a:rPr lang="de-CH" sz="1000" dirty="0" err="1" smtClean="0"/>
+              <a:t>to</a:t>
+            </a:r>
+            <a:r>
+              <a:rPr lang="de-CH" sz="1000" dirty="0" smtClean="0"/>
+              <a:t> </a:t>
+            </a:r>
+            <a:r>
+              <a:rPr lang="de-CH" sz="1000" dirty="0" err="1" smtClean="0"/>
+              <a:t>the</a:t>
+            </a:r>
+            <a:r>
+              <a:rPr lang="de-CH" sz="1000" dirty="0" smtClean="0"/>
+              <a:t> </a:t>
+            </a:r>
+            <a:r>
+              <a:rPr lang="de-CH" sz="1000" dirty="0" err="1" smtClean="0"/>
+              <a:t>server</a:t>
+            </a:r>
+            <a:r>
+              <a:rPr lang="de-CH" sz="1000" dirty="0" smtClean="0"/>
+              <a:t>. </a:t>
+            </a:r>
+            <a:r>
+              <a:rPr lang="de-CH" sz="1000" dirty="0" err="1"/>
+              <a:t>W</a:t>
+            </a:r>
+            <a:r>
+              <a:rPr lang="de-CH" sz="1000" dirty="0" err="1" smtClean="0"/>
+              <a:t>ebapp</a:t>
+            </a:r>
+            <a:r>
+              <a:rPr lang="de-CH" sz="1000" dirty="0" smtClean="0"/>
+              <a:t> </a:t>
+            </a:r>
+            <a:r>
+              <a:rPr lang="de-CH" sz="1000" dirty="0" err="1" smtClean="0"/>
+              <a:t>connects</a:t>
+            </a:r>
+            <a:r>
+              <a:rPr lang="de-CH" sz="1000" dirty="0" smtClean="0"/>
+              <a:t> </a:t>
+            </a:r>
+            <a:r>
+              <a:rPr lang="de-CH" sz="1000" dirty="0" err="1" smtClean="0"/>
+              <a:t>to</a:t>
+            </a:r>
+            <a:r>
+              <a:rPr lang="de-CH" sz="1000" dirty="0" smtClean="0"/>
+              <a:t> </a:t>
+            </a:r>
+            <a:r>
+              <a:rPr lang="de-CH" sz="1000" dirty="0" err="1" smtClean="0"/>
+              <a:t>the</a:t>
+            </a:r>
+            <a:r>
+              <a:rPr lang="de-CH" sz="1000" dirty="0" smtClean="0"/>
+              <a:t> </a:t>
+            </a:r>
+            <a:r>
+              <a:rPr lang="de-CH" sz="1000" dirty="0" err="1" smtClean="0"/>
+              <a:t>server</a:t>
+            </a:r>
+            <a:r>
+              <a:rPr lang="de-CH" sz="1000" dirty="0" smtClean="0"/>
+              <a:t>.</a:t>
+            </a:r>
+            <a:endParaRPr lang="en-US" sz="1200" dirty="0" smtClean="0"/>
+          </a:p>
+        </p:txBody>
+      </p:sp>
+      <p:sp>
+        <p:nvSpPr>
+          <p:cNvPr id="127" name="Rechteck 126"/>
+          <p:cNvSpPr/>
+          <p:nvPr/>
+        </p:nvSpPr>
+        <p:spPr>
+          <a:xfrm>
+            <a:off x="0" y="2500306"/>
+            <a:ext cx="2928926" cy="357190"/>
+          </a:xfrm>
+          <a:prstGeom prst="rect">
+            <a:avLst/>
+          </a:prstGeom>
+          <a:solidFill>
+            <a:schemeClr val="bg1">
+              <a:lumMod val="75000"/>
+            </a:schemeClr>
+          </a:solidFill>
+          <a:ln w="12700">
+            <a:solidFill>
+              <a:schemeClr val="bg1">
+                <a:lumMod val="75000"/>
+              </a:schemeClr>
+            </a:solidFill>
+          </a:ln>
+        </p:spPr>
+        <p:style>
+          <a:lnRef idx="2">
+            <a:schemeClr val="dk1"/>
+          </a:lnRef>
+          <a:fillRef idx="1">
+            <a:schemeClr val="lt1"/>
+          </a:fillRef>
+          <a:effectRef idx="0">
+            <a:schemeClr val="dk1"/>
+          </a:effectRef>
+          <a:fontRef idx="minor">
+            <a:schemeClr val="dk1"/>
+          </a:fontRef>
+        </p:style>
+        <p:txBody>
+          <a:bodyPr rtlCol="0" anchor="ctr"/>
+          <a:lstStyle/>
+          <a:p>
+            <a:r>
+              <a:rPr lang="de-CH" sz="1000" dirty="0" smtClean="0"/>
+              <a:t>A </a:t>
+            </a:r>
+            <a:r>
+              <a:rPr lang="de-CH" sz="1000" dirty="0" err="1" smtClean="0"/>
+              <a:t>request</a:t>
+            </a:r>
+            <a:r>
+              <a:rPr lang="de-CH" sz="1000" dirty="0" smtClean="0"/>
+              <a:t> </a:t>
+            </a:r>
+            <a:r>
+              <a:rPr lang="de-CH" sz="1000" dirty="0" err="1" smtClean="0"/>
+              <a:t>is</a:t>
+            </a:r>
+            <a:r>
+              <a:rPr lang="de-CH" sz="1000" dirty="0" smtClean="0"/>
+              <a:t> </a:t>
+            </a:r>
+            <a:r>
+              <a:rPr lang="de-CH" sz="1000" dirty="0" err="1" smtClean="0"/>
+              <a:t>forwarded</a:t>
+            </a:r>
+            <a:r>
+              <a:rPr lang="de-CH" sz="1000" dirty="0" smtClean="0"/>
+              <a:t> </a:t>
+            </a:r>
+            <a:r>
+              <a:rPr lang="de-CH" sz="1000" dirty="0" err="1" smtClean="0"/>
+              <a:t>from</a:t>
+            </a:r>
+            <a:r>
+              <a:rPr lang="de-CH" sz="1000" dirty="0" smtClean="0"/>
+              <a:t> </a:t>
+            </a:r>
+            <a:r>
+              <a:rPr lang="de-CH" sz="1000" dirty="0" err="1" smtClean="0"/>
+              <a:t>the</a:t>
+            </a:r>
+            <a:r>
+              <a:rPr lang="de-CH" sz="1000" dirty="0" smtClean="0"/>
+              <a:t> HTTP Server </a:t>
+            </a:r>
+            <a:r>
+              <a:rPr lang="de-CH" sz="1000" dirty="0" err="1" smtClean="0"/>
+              <a:t>to</a:t>
+            </a:r>
+            <a:r>
+              <a:rPr lang="de-CH" sz="1000" dirty="0" smtClean="0"/>
+              <a:t> </a:t>
+            </a:r>
+            <a:r>
+              <a:rPr lang="de-CH" sz="1000" dirty="0" err="1" smtClean="0"/>
+              <a:t>the</a:t>
+            </a:r>
+            <a:r>
+              <a:rPr lang="de-CH" sz="1000" dirty="0" smtClean="0"/>
+              <a:t> </a:t>
+            </a:r>
+            <a:r>
+              <a:rPr lang="de-CH" sz="1000" dirty="0" err="1" smtClean="0"/>
+              <a:t>webapp</a:t>
+            </a:r>
+            <a:r>
+              <a:rPr lang="de-CH" sz="1000" dirty="0" smtClean="0"/>
+              <a:t>. Server </a:t>
+            </a:r>
+            <a:r>
+              <a:rPr lang="de-CH" sz="1000" dirty="0" err="1" smtClean="0"/>
+              <a:t>connects</a:t>
+            </a:r>
+            <a:r>
+              <a:rPr lang="de-CH" sz="1000" dirty="0" smtClean="0"/>
+              <a:t> </a:t>
+            </a:r>
+            <a:r>
+              <a:rPr lang="de-CH" sz="1000" dirty="0" err="1" smtClean="0"/>
+              <a:t>to</a:t>
+            </a:r>
+            <a:r>
+              <a:rPr lang="de-CH" sz="1000" dirty="0" smtClean="0"/>
+              <a:t> </a:t>
+            </a:r>
+            <a:r>
+              <a:rPr lang="de-CH" sz="1000" dirty="0" err="1" smtClean="0"/>
+              <a:t>webapp</a:t>
+            </a:r>
+            <a:r>
+              <a:rPr lang="de-CH" sz="1000" dirty="0" smtClean="0"/>
+              <a:t>. </a:t>
+            </a:r>
+            <a:endParaRPr lang="en-US" sz="1000" dirty="0"/>
+          </a:p>
+        </p:txBody>
+      </p:sp>
+      <p:sp>
+        <p:nvSpPr>
+          <p:cNvPr id="128" name="Rechteck 127"/>
+          <p:cNvSpPr/>
+          <p:nvPr/>
+        </p:nvSpPr>
+        <p:spPr>
+          <a:xfrm>
+            <a:off x="0" y="1142984"/>
+            <a:ext cx="9144000" cy="1714512"/>
+          </a:xfrm>
+          <a:prstGeom prst="rect">
+            <a:avLst/>
+          </a:prstGeom>
+          <a:noFill/>
+          <a:ln w="12700">
+            <a:solidFill>
+              <a:schemeClr val="bg1">
+                <a:lumMod val="75000"/>
+              </a:schemeClr>
+            </a:solidFill>
+          </a:ln>
+        </p:spPr>
+        <p:style>
+          <a:lnRef idx="2">
+            <a:schemeClr val="dk1"/>
+          </a:lnRef>
+          <a:fillRef idx="1">
+            <a:schemeClr val="lt1"/>
+          </a:fillRef>
+          <a:effectRef idx="0">
+            <a:schemeClr val="dk1"/>
+          </a:effectRef>
+          <a:fontRef idx="minor">
+            <a:schemeClr val="dk1"/>
+          </a:fontRef>
+        </p:style>
+        <p:txBody>
+          <a:bodyPr rtlCol="0" anchor="ctr"/>
+          <a:lstStyle/>
+          <a:p>
+            <a:pPr algn="ctr"/>
+            <a:endParaRPr lang="en-US" sz="1200" dirty="0" smtClean="0"/>
+          </a:p>
+        </p:txBody>
+      </p:sp>
     </p:spTree>
   </p:cSld>
   <p:clrMapOvr>
     <a:masterClrMapping/>
   </p:clrMapOvr>
+  <p:timing>
+    <p:tnLst>
+      <p:par>
+        <p:cTn id="1" dur="indefinite" restart="never" nodeType="tmRoot"/>
+      </p:par>
+    </p:tnLst>
+  </p:timing>
 </p:sld>
 </file>
 

</xml_diff>